<commit_message>
feat: add draft srs
</commit_message>
<xml_diff>
--- a/docs/SRS/SystemContextFigure.pptx
+++ b/docs/SRS/SystemContextFigure.pptx
@@ -3298,9 +3298,9 @@
           <p:grpSpPr>
             <a:xfrm>
               <a:off x="3885481" y="3381165"/>
-              <a:ext cx="1523744" cy="1246370"/>
+              <a:ext cx="1483694" cy="1246370"/>
               <a:chOff x="3703297" y="1721177"/>
-              <a:chExt cx="1523744" cy="1246370"/>
+              <a:chExt cx="1483694" cy="1246370"/>
             </a:xfrm>
           </p:grpSpPr>
           <p:sp>
@@ -3360,8 +3360,8 @@
             </p:nvSpPr>
             <p:spPr>
               <a:xfrm>
-                <a:off x="3726309" y="2113529"/>
-                <a:ext cx="1500732" cy="461665"/>
+                <a:off x="3722982" y="1874847"/>
+                <a:ext cx="1456055" cy="819150"/>
               </a:xfrm>
               <a:prstGeom prst="rect">
                 <a:avLst/>
@@ -3369,17 +3369,30 @@
               <a:noFill/>
             </p:spPr>
             <p:txBody>
-              <a:bodyPr wrap="none" rtlCol="0">
-                <a:spAutoFit/>
+              <a:bodyPr wrap="square" rtlCol="0">
+                <a:noAutofit/>
               </a:bodyPr>
               <a:lstStyle/>
               <a:p>
                 <a:r>
-                  <a:rPr lang="en-US" sz="2400" dirty="0" err="1">
+                  <a:rPr lang="en-US" sz="2400" dirty="0">
                     <a:latin typeface="Times New Roman" panose="02020503050405090304"/>
                     <a:cs typeface="Times New Roman" panose="02020503050405090304"/>
                   </a:rPr>
-                  <a:t>ProgName</a:t>
+                  <a:t>NCRF</a:t>
+                </a:r>
+                <a:endParaRPr lang="en-US" sz="2400" dirty="0">
+                  <a:latin typeface="Times New Roman" panose="02020503050405090304"/>
+                  <a:cs typeface="Times New Roman" panose="02020503050405090304"/>
+                </a:endParaRPr>
+              </a:p>
+              <a:p>
+                <a:r>
+                  <a:rPr lang="en-US" sz="2400" dirty="0">
+                    <a:latin typeface="Times New Roman" panose="02020503050405090304"/>
+                    <a:cs typeface="Times New Roman" panose="02020503050405090304"/>
+                  </a:rPr>
+                  <a:t>PipeLine</a:t>
                 </a:r>
                 <a:endParaRPr lang="en-US" sz="2400" dirty="0">
                   <a:latin typeface="Times New Roman" panose="02020503050405090304"/>

</xml_diff>